<commit_message>
Commenting Puerto Rico due to missing GeoJSON
</commit_message>
<xml_diff>
--- a/Project_2.pptx
+++ b/Project_2.pptx
@@ -5,13 +5,14 @@
     <p:sldMasterId id="2147483648" r:id="rId1"/>
   </p:sldMasterIdLst>
   <p:notesMasterIdLst>
-    <p:notesMasterId r:id="rId6"/>
+    <p:notesMasterId r:id="rId7"/>
   </p:notesMasterIdLst>
   <p:sldIdLst>
     <p:sldId id="256" r:id="rId2"/>
     <p:sldId id="257" r:id="rId3"/>
     <p:sldId id="259" r:id="rId4"/>
     <p:sldId id="258" r:id="rId5"/>
+    <p:sldId id="262" r:id="rId6"/>
   </p:sldIdLst>
   <p:sldSz cx="12192000" cy="6858000"/>
   <p:notesSz cx="6858000" cy="9144000"/>
@@ -200,7 +201,7 @@
           <a:p>
             <a:fld id="{D787FA33-36A0-4BA6-AA24-14202E5CC49F}" type="datetimeFigureOut">
               <a:rPr lang="en-US" smtClean="0"/>
-              <a:t>9/8/2020</a:t>
+              <a:t>9/14/2020</a:t>
             </a:fld>
             <a:endParaRPr lang="en-US"/>
           </a:p>
@@ -803,6 +804,90 @@
 </p:notes>
 </file>
 
+<file path=ppt/notesSlides/notesSlide5.xml><?xml version="1.0" encoding="utf-8"?>
+<p:notes xmlns:a="http://schemas.openxmlformats.org/drawingml/2006/main" xmlns:r="http://schemas.openxmlformats.org/officeDocument/2006/relationships" xmlns:p="http://schemas.openxmlformats.org/presentationml/2006/main">
+  <p:cSld>
+    <p:spTree>
+      <p:nvGrpSpPr>
+        <p:cNvPr id="1" name=""/>
+        <p:cNvGrpSpPr/>
+        <p:nvPr/>
+      </p:nvGrpSpPr>
+      <p:grpSpPr>
+        <a:xfrm>
+          <a:off x="0" y="0"/>
+          <a:ext cx="0" cy="0"/>
+          <a:chOff x="0" y="0"/>
+          <a:chExt cx="0" cy="0"/>
+        </a:xfrm>
+      </p:grpSpPr>
+      <p:sp>
+        <p:nvSpPr>
+          <p:cNvPr id="2" name="Slide Image Placeholder 1"/>
+          <p:cNvSpPr>
+            <a:spLocks noGrp="1" noRot="1" noChangeAspect="1"/>
+          </p:cNvSpPr>
+          <p:nvPr>
+            <p:ph type="sldImg"/>
+          </p:nvPr>
+        </p:nvSpPr>
+        <p:spPr/>
+      </p:sp>
+      <p:sp>
+        <p:nvSpPr>
+          <p:cNvPr id="3" name="Notes Placeholder 2"/>
+          <p:cNvSpPr>
+            <a:spLocks noGrp="1"/>
+          </p:cNvSpPr>
+          <p:nvPr>
+            <p:ph type="body" idx="1"/>
+          </p:nvPr>
+        </p:nvSpPr>
+        <p:spPr/>
+        <p:txBody>
+          <a:bodyPr/>
+          <a:lstStyle/>
+          <a:p>
+            <a:endParaRPr lang="en-US" dirty="0"/>
+          </a:p>
+        </p:txBody>
+      </p:sp>
+      <p:sp>
+        <p:nvSpPr>
+          <p:cNvPr id="4" name="Slide Number Placeholder 3"/>
+          <p:cNvSpPr>
+            <a:spLocks noGrp="1"/>
+          </p:cNvSpPr>
+          <p:nvPr>
+            <p:ph type="sldNum" sz="quarter" idx="5"/>
+          </p:nvPr>
+        </p:nvSpPr>
+        <p:spPr/>
+        <p:txBody>
+          <a:bodyPr/>
+          <a:lstStyle/>
+          <a:p>
+            <a:fld id="{00CD4E95-15EC-4946-8EB1-8EEE30E889E3}" type="slidenum">
+              <a:rPr lang="en-US" smtClean="0"/>
+              <a:t>5</a:t>
+            </a:fld>
+            <a:endParaRPr lang="en-US"/>
+          </a:p>
+        </p:txBody>
+      </p:sp>
+    </p:spTree>
+    <p:extLst>
+      <p:ext uri="{BB962C8B-B14F-4D97-AF65-F5344CB8AC3E}">
+        <p14:creationId xmlns:p14="http://schemas.microsoft.com/office/powerpoint/2010/main" val="1503508265"/>
+      </p:ext>
+    </p:extLst>
+  </p:cSld>
+  <p:clrMapOvr>
+    <a:masterClrMapping/>
+  </p:clrMapOvr>
+</p:notes>
+</file>
+
 <file path=ppt/slideLayouts/slideLayout1.xml><?xml version="1.0" encoding="utf-8"?>
 <p:sldLayout xmlns:a="http://schemas.openxmlformats.org/drawingml/2006/main" xmlns:r="http://schemas.openxmlformats.org/officeDocument/2006/relationships" xmlns:p="http://schemas.openxmlformats.org/presentationml/2006/main" type="title" preserve="1">
   <p:cSld name="Title Slide">
@@ -950,7 +1035,7 @@
           <a:p>
             <a:fld id="{76390919-E38A-43AC-80A0-C781043285AC}" type="datetimeFigureOut">
               <a:rPr lang="en-US" smtClean="0"/>
-              <a:t>9/8/2020</a:t>
+              <a:t>9/14/2020</a:t>
             </a:fld>
             <a:endParaRPr lang="en-US"/>
           </a:p>
@@ -1148,7 +1233,7 @@
           <a:p>
             <a:fld id="{76390919-E38A-43AC-80A0-C781043285AC}" type="datetimeFigureOut">
               <a:rPr lang="en-US" smtClean="0"/>
-              <a:t>9/8/2020</a:t>
+              <a:t>9/14/2020</a:t>
             </a:fld>
             <a:endParaRPr lang="en-US"/>
           </a:p>
@@ -1356,7 +1441,7 @@
           <a:p>
             <a:fld id="{76390919-E38A-43AC-80A0-C781043285AC}" type="datetimeFigureOut">
               <a:rPr lang="en-US" smtClean="0"/>
-              <a:t>9/8/2020</a:t>
+              <a:t>9/14/2020</a:t>
             </a:fld>
             <a:endParaRPr lang="en-US"/>
           </a:p>
@@ -1554,7 +1639,7 @@
           <a:p>
             <a:fld id="{76390919-E38A-43AC-80A0-C781043285AC}" type="datetimeFigureOut">
               <a:rPr lang="en-US" smtClean="0"/>
-              <a:t>9/8/2020</a:t>
+              <a:t>9/14/2020</a:t>
             </a:fld>
             <a:endParaRPr lang="en-US"/>
           </a:p>
@@ -1829,7 +1914,7 @@
           <a:p>
             <a:fld id="{76390919-E38A-43AC-80A0-C781043285AC}" type="datetimeFigureOut">
               <a:rPr lang="en-US" smtClean="0"/>
-              <a:t>9/8/2020</a:t>
+              <a:t>9/14/2020</a:t>
             </a:fld>
             <a:endParaRPr lang="en-US"/>
           </a:p>
@@ -2094,7 +2179,7 @@
           <a:p>
             <a:fld id="{76390919-E38A-43AC-80A0-C781043285AC}" type="datetimeFigureOut">
               <a:rPr lang="en-US" smtClean="0"/>
-              <a:t>9/8/2020</a:t>
+              <a:t>9/14/2020</a:t>
             </a:fld>
             <a:endParaRPr lang="en-US"/>
           </a:p>
@@ -2506,7 +2591,7 @@
           <a:p>
             <a:fld id="{76390919-E38A-43AC-80A0-C781043285AC}" type="datetimeFigureOut">
               <a:rPr lang="en-US" smtClean="0"/>
-              <a:t>9/8/2020</a:t>
+              <a:t>9/14/2020</a:t>
             </a:fld>
             <a:endParaRPr lang="en-US"/>
           </a:p>
@@ -2647,7 +2732,7 @@
           <a:p>
             <a:fld id="{76390919-E38A-43AC-80A0-C781043285AC}" type="datetimeFigureOut">
               <a:rPr lang="en-US" smtClean="0"/>
-              <a:t>9/8/2020</a:t>
+              <a:t>9/14/2020</a:t>
             </a:fld>
             <a:endParaRPr lang="en-US"/>
           </a:p>
@@ -2760,7 +2845,7 @@
           <a:p>
             <a:fld id="{76390919-E38A-43AC-80A0-C781043285AC}" type="datetimeFigureOut">
               <a:rPr lang="en-US" smtClean="0"/>
-              <a:t>9/8/2020</a:t>
+              <a:t>9/14/2020</a:t>
             </a:fld>
             <a:endParaRPr lang="en-US"/>
           </a:p>
@@ -3071,7 +3156,7 @@
           <a:p>
             <a:fld id="{76390919-E38A-43AC-80A0-C781043285AC}" type="datetimeFigureOut">
               <a:rPr lang="en-US" smtClean="0"/>
-              <a:t>9/8/2020</a:t>
+              <a:t>9/14/2020</a:t>
             </a:fld>
             <a:endParaRPr lang="en-US"/>
           </a:p>
@@ -3359,7 +3444,7 @@
           <a:p>
             <a:fld id="{76390919-E38A-43AC-80A0-C781043285AC}" type="datetimeFigureOut">
               <a:rPr lang="en-US" smtClean="0"/>
-              <a:t>9/8/2020</a:t>
+              <a:t>9/14/2020</a:t>
             </a:fld>
             <a:endParaRPr lang="en-US"/>
           </a:p>
@@ -3600,7 +3685,7 @@
           <a:p>
             <a:fld id="{76390919-E38A-43AC-80A0-C781043285AC}" type="datetimeFigureOut">
               <a:rPr lang="en-US" smtClean="0"/>
-              <a:t>9/8/2020</a:t>
+              <a:t>9/14/2020</a:t>
             </a:fld>
             <a:endParaRPr lang="en-US"/>
           </a:p>
@@ -4999,8 +5084,8 @@
         </p:nvSpPr>
         <p:spPr>
           <a:xfrm>
-            <a:off x="4654296" y="967563"/>
-            <a:ext cx="7149082" cy="4944139"/>
+            <a:off x="4654296" y="623275"/>
+            <a:ext cx="7149082" cy="5607882"/>
           </a:xfrm>
         </p:spPr>
         <p:txBody>
@@ -5075,7 +5160,7 @@
             <a:r>
               <a:rPr lang="en-US" sz="1400" dirty="0">
                 <a:latin typeface="Lucida Sans Typewriter" panose="020B0509030504030204" pitchFamily="49" charset="0"/>
-                <a:hlinkClick r:id="rId3"/>
+                <a:hlinkClick r:id="rId4"/>
               </a:rPr>
               <a:t>https://www.purpleair.com/</a:t>
             </a:r>
@@ -5087,34 +5172,144 @@
             <a:pPr marL="457200" lvl="1" indent="0">
               <a:buNone/>
             </a:pPr>
-            <a:r>
-              <a:rPr lang="en-US" sz="1400" dirty="0">
-                <a:latin typeface="Lucida Sans Typewriter" panose="020B0509030504030204" pitchFamily="49" charset="0"/>
-                <a:hlinkClick r:id="rId4"/>
-              </a:rPr>
-              <a:t>https://www.epa.gov/</a:t>
-            </a:r>
             <a:endParaRPr lang="en-US" sz="1400" dirty="0">
               <a:latin typeface="Lucida Sans Typewriter" panose="020B0509030504030204" pitchFamily="49" charset="0"/>
             </a:endParaRPr>
           </a:p>
           <a:p>
-            <a:pPr marL="457200" lvl="1" indent="0">
+            <a:pPr marL="0" indent="0">
               <a:buNone/>
             </a:pPr>
+            <a:r>
+              <a:rPr lang="en-US" sz="1400" b="1" dirty="0">
+                <a:latin typeface="Lucida Sans Typewriter" panose="020B0509030504030204" pitchFamily="49" charset="0"/>
+              </a:rPr>
+              <a:t>Inspired by</a:t>
+            </a:r>
+            <a:r>
+              <a:rPr lang="en-US" sz="1400" dirty="0">
+                <a:latin typeface="Lucida Sans Typewriter" panose="020B0509030504030204" pitchFamily="49" charset="0"/>
+              </a:rPr>
+              <a:t>: </a:t>
+            </a:r>
             <a:r>
               <a:rPr lang="en-US" sz="1400" dirty="0">
                 <a:latin typeface="Lucida Sans Typewriter" panose="020B0509030504030204" pitchFamily="49" charset="0"/>
                 <a:hlinkClick r:id="rId5"/>
               </a:rPr>
-              <a:t>https://fire.airnow.gov/#</a:t>
+              <a:t>https://www.kaggle.com/captcalculator/wildfire-exploratory-analysis</a:t>
             </a:r>
             <a:endParaRPr lang="en-US" sz="1400" dirty="0">
               <a:latin typeface="Lucida Sans Typewriter" panose="020B0509030504030204" pitchFamily="49" charset="0"/>
             </a:endParaRPr>
           </a:p>
           <a:p>
-            <a:pPr marL="457200" lvl="1" indent="0">
+            <a:pPr marL="0" indent="0">
+              <a:buNone/>
+            </a:pPr>
+            <a:endParaRPr lang="en-US" sz="1400" b="1" dirty="0">
+              <a:latin typeface="Lucida Sans Typewriter" panose="020B0509030504030204" pitchFamily="49" charset="0"/>
+            </a:endParaRPr>
+          </a:p>
+          <a:p>
+            <a:pPr marL="0" indent="0">
+              <a:buNone/>
+            </a:pPr>
+            <a:r>
+              <a:rPr lang="en-US" sz="1400" b="1" dirty="0">
+                <a:latin typeface="Lucida Sans Typewriter" panose="020B0509030504030204" pitchFamily="49" charset="0"/>
+              </a:rPr>
+              <a:t>Visualizations</a:t>
+            </a:r>
+            <a:r>
+              <a:rPr lang="en-US" sz="1400" dirty="0">
+                <a:latin typeface="Lucida Sans Typewriter" panose="020B0509030504030204" pitchFamily="49" charset="0"/>
+              </a:rPr>
+              <a:t>: Plotly Charts: Bar, Bubble, Pie &amp; Stacked</a:t>
+            </a:r>
+          </a:p>
+          <a:p>
+            <a:pPr marL="0" indent="0">
+              <a:buNone/>
+            </a:pPr>
+            <a:r>
+              <a:rPr lang="en-US" sz="1400" dirty="0">
+                <a:latin typeface="Lucida Sans Typewriter" panose="020B0509030504030204" pitchFamily="49" charset="0"/>
+              </a:rPr>
+              <a:t>                Plotly Data table</a:t>
+            </a:r>
+          </a:p>
+          <a:p>
+            <a:pPr marL="0" indent="0">
+              <a:buNone/>
+            </a:pPr>
+            <a:r>
+              <a:rPr lang="en-US" sz="1400" dirty="0">
+                <a:latin typeface="Lucida Sans Typewriter" panose="020B0509030504030204" pitchFamily="49" charset="0"/>
+              </a:rPr>
+              <a:t>	       Choropleth Map</a:t>
+            </a:r>
+          </a:p>
+          <a:p>
+            <a:pPr marL="0" indent="0">
+              <a:buNone/>
+            </a:pPr>
+            <a:r>
+              <a:rPr lang="en-US" sz="1400" dirty="0">
+                <a:latin typeface="Lucida Sans Typewriter" panose="020B0509030504030204" pitchFamily="49" charset="0"/>
+              </a:rPr>
+              <a:t>	       Marker Cluster Group </a:t>
+            </a:r>
+            <a:r>
+              <a:rPr lang="en-US" sz="1400" dirty="0" err="1">
+                <a:latin typeface="Lucida Sans Typewriter" panose="020B0509030504030204" pitchFamily="49" charset="0"/>
+              </a:rPr>
+              <a:t>GeoMap</a:t>
+            </a:r>
+            <a:endParaRPr lang="en-US" sz="1400" dirty="0">
+              <a:latin typeface="Lucida Sans Typewriter" panose="020B0509030504030204" pitchFamily="49" charset="0"/>
+            </a:endParaRPr>
+          </a:p>
+          <a:p>
+            <a:pPr marL="0" indent="0">
+              <a:buNone/>
+            </a:pPr>
+            <a:r>
+              <a:rPr lang="en-US" sz="1400" dirty="0">
+                <a:latin typeface="Lucida Sans Typewriter" panose="020B0509030504030204" pitchFamily="49" charset="0"/>
+              </a:rPr>
+              <a:t>                </a:t>
+            </a:r>
+          </a:p>
+          <a:p>
+            <a:pPr marL="0" indent="0">
+              <a:buNone/>
+            </a:pPr>
+            <a:r>
+              <a:rPr lang="en-US" sz="1400" b="1" dirty="0">
+                <a:latin typeface="Lucida Sans Typewriter" panose="020B0509030504030204" pitchFamily="49" charset="0"/>
+              </a:rPr>
+              <a:t>GitHub</a:t>
+            </a:r>
+            <a:r>
+              <a:rPr lang="en-US" sz="1400" dirty="0">
+                <a:latin typeface="Lucida Sans Typewriter" panose="020B0509030504030204" pitchFamily="49" charset="0"/>
+              </a:rPr>
+              <a:t>: </a:t>
+            </a:r>
+            <a:r>
+              <a:rPr lang="en-US" sz="1400" dirty="0">
+                <a:latin typeface="Lucida Sans Typewriter" panose="020B0509030504030204" pitchFamily="49" charset="0"/>
+                <a:hlinkClick r:id="rId6"/>
+              </a:rPr>
+              <a:t>https://github.com/TheGreekGoddess/Project_2</a:t>
+            </a:r>
+            <a:endParaRPr lang="en-US" sz="1400" dirty="0">
+              <a:latin typeface="Lucida Sans Typewriter" panose="020B0509030504030204" pitchFamily="49" charset="0"/>
+            </a:endParaRPr>
+          </a:p>
+          <a:p>
+            <a:pPr marL="0" indent="0">
               <a:buNone/>
             </a:pPr>
             <a:endParaRPr lang="en-US" sz="1400" dirty="0">
@@ -5126,140 +5321,17 @@
               <a:buNone/>
             </a:pPr>
             <a:r>
-              <a:rPr lang="en-US" sz="1400" b="1" dirty="0">
-                <a:latin typeface="Lucida Sans Typewriter" panose="020B0509030504030204" pitchFamily="49" charset="0"/>
-              </a:rPr>
-              <a:t>Inspired by</a:t>
-            </a:r>
-            <a:r>
               <a:rPr lang="en-US" sz="1400" dirty="0">
                 <a:latin typeface="Lucida Sans Typewriter" panose="020B0509030504030204" pitchFamily="49" charset="0"/>
               </a:rPr>
-              <a:t>: </a:t>
-            </a:r>
-            <a:r>
-              <a:rPr lang="en-US" sz="1400" dirty="0">
-                <a:latin typeface="Lucida Sans Typewriter" panose="020B0509030504030204" pitchFamily="49" charset="0"/>
-                <a:hlinkClick r:id="rId6"/>
-              </a:rPr>
-              <a:t>https://www.kaggle.com/captcalculator/wildfire-exploratory-analysis</a:t>
-            </a:r>
-            <a:endParaRPr lang="en-US" sz="1400" dirty="0">
-              <a:latin typeface="Lucida Sans Typewriter" panose="020B0509030504030204" pitchFamily="49" charset="0"/>
-            </a:endParaRPr>
-          </a:p>
-          <a:p>
-            <a:pPr marL="0" indent="0">
-              <a:buNone/>
-            </a:pPr>
-            <a:endParaRPr lang="en-US" sz="1400" b="1" dirty="0">
-              <a:latin typeface="Lucida Sans Typewriter" panose="020B0509030504030204" pitchFamily="49" charset="0"/>
-            </a:endParaRPr>
-          </a:p>
-          <a:p>
-            <a:pPr marL="0" indent="0">
-              <a:buNone/>
-            </a:pPr>
-            <a:r>
-              <a:rPr lang="en-US" sz="1400" b="1" dirty="0">
-                <a:latin typeface="Lucida Sans Typewriter" panose="020B0509030504030204" pitchFamily="49" charset="0"/>
-              </a:rPr>
-              <a:t>Visualizations</a:t>
-            </a:r>
-            <a:r>
-              <a:rPr lang="en-US" sz="1400" dirty="0">
-                <a:latin typeface="Lucida Sans Typewriter" panose="020B0509030504030204" pitchFamily="49" charset="0"/>
-              </a:rPr>
-              <a:t>: Charts and Maps</a:t>
-            </a:r>
-          </a:p>
-          <a:p>
-            <a:pPr marL="0" indent="0">
-              <a:buNone/>
-            </a:pPr>
-            <a:endParaRPr lang="en-US" sz="1400" dirty="0">
-              <a:latin typeface="Lucida Sans Typewriter" panose="020B0509030504030204" pitchFamily="49" charset="0"/>
-            </a:endParaRPr>
-          </a:p>
-          <a:p>
-            <a:pPr marL="0" indent="0">
-              <a:buNone/>
-            </a:pPr>
-            <a:r>
-              <a:rPr lang="en-US" sz="1400" b="1" dirty="0">
-                <a:latin typeface="Lucida Sans Typewriter" panose="020B0509030504030204" pitchFamily="49" charset="0"/>
-              </a:rPr>
-              <a:t>Sketch of the final design</a:t>
-            </a:r>
-            <a:r>
-              <a:rPr lang="en-US" sz="1400" dirty="0">
-                <a:latin typeface="Lucida Sans Typewriter" panose="020B0509030504030204" pitchFamily="49" charset="0"/>
-              </a:rPr>
-              <a:t>: Charts &amp; Layered maps of fires</a:t>
-            </a:r>
-          </a:p>
-          <a:p>
-            <a:pPr marL="0" indent="0">
-              <a:buNone/>
-            </a:pPr>
-            <a:endParaRPr lang="en-US" sz="1400" dirty="0">
-              <a:latin typeface="Lucida Sans Typewriter" panose="020B0509030504030204" pitchFamily="49" charset="0"/>
-            </a:endParaRPr>
-          </a:p>
-          <a:p>
-            <a:pPr marL="0" indent="0">
-              <a:buNone/>
-            </a:pPr>
-            <a:r>
-              <a:rPr lang="en-US" sz="1400" b="1" dirty="0">
-                <a:latin typeface="Lucida Sans Typewriter" panose="020B0509030504030204" pitchFamily="49" charset="0"/>
-              </a:rPr>
-              <a:t>GitHub</a:t>
-            </a:r>
-            <a:r>
-              <a:rPr lang="en-US" sz="1400" dirty="0">
-                <a:latin typeface="Lucida Sans Typewriter" panose="020B0509030504030204" pitchFamily="49" charset="0"/>
-              </a:rPr>
-              <a:t>: </a:t>
+              <a:t>Heroku: </a:t>
             </a:r>
             <a:r>
               <a:rPr lang="en-US" sz="1400" dirty="0">
                 <a:latin typeface="Lucida Sans Typewriter" panose="020B0509030504030204" pitchFamily="49" charset="0"/>
                 <a:hlinkClick r:id="rId7"/>
               </a:rPr>
-              <a:t>https://github.com/TheGreekGoddess/Project_2</a:t>
-            </a:r>
-            <a:endParaRPr lang="en-US" sz="1400" dirty="0">
-              <a:latin typeface="Lucida Sans Typewriter" panose="020B0509030504030204" pitchFamily="49" charset="0"/>
-            </a:endParaRPr>
-          </a:p>
-          <a:p>
-            <a:pPr marL="0" indent="0">
-              <a:buNone/>
-            </a:pPr>
-            <a:endParaRPr lang="en-US" sz="1400" dirty="0">
-              <a:latin typeface="Lucida Sans Typewriter" panose="020B0509030504030204" pitchFamily="49" charset="0"/>
-            </a:endParaRPr>
-          </a:p>
-          <a:p>
-            <a:pPr marL="0" indent="0">
-              <a:buNone/>
-            </a:pPr>
-            <a:r>
-              <a:rPr lang="en-US" sz="1400" b="1" dirty="0">
-                <a:latin typeface="Lucida Sans Typewriter" panose="020B0509030504030204" pitchFamily="49" charset="0"/>
-              </a:rPr>
-              <a:t>Bonus</a:t>
-            </a:r>
-            <a:r>
-              <a:rPr lang="en-US" sz="1400" dirty="0">
-                <a:latin typeface="Lucida Sans Typewriter" panose="020B0509030504030204" pitchFamily="49" charset="0"/>
-              </a:rPr>
-              <a:t>: **Suprise map, </a:t>
-            </a:r>
-            <a:r>
-              <a:rPr lang="en-US" sz="1400" dirty="0"/>
-              <a:t>Flame pointers if feasible</a:t>
+              <a:t>https://datavisproject2.herokuapp.com/</a:t>
             </a:r>
             <a:endParaRPr lang="en-US" sz="1400" dirty="0">
               <a:latin typeface="Lucida Sans Typewriter" panose="020B0509030504030204" pitchFamily="49" charset="0"/>
@@ -5498,17 +5570,55 @@
                 <a:latin typeface="Lucida Sans Unicode" panose="020B0602030504020204" pitchFamily="34" charset="0"/>
                 <a:cs typeface="Lucida Sans Unicode" panose="020B0602030504020204" pitchFamily="34" charset="0"/>
               </a:rPr>
-              <a:t>MA - Index html</a:t>
-            </a:r>
-          </a:p>
-          <a:p>
-            <a:pPr lvl="1"/>
+              <a:t>AG - Map: </a:t>
+            </a:r>
+            <a:r>
+              <a:rPr lang="en-US" sz="2000" dirty="0" err="1">
+                <a:latin typeface="Lucida Sans Unicode" panose="020B0602030504020204" pitchFamily="34" charset="0"/>
+                <a:cs typeface="Lucida Sans Unicode" panose="020B0602030504020204" pitchFamily="34" charset="0"/>
+              </a:rPr>
+              <a:t>Geomap</a:t>
+            </a:r>
             <a:r>
               <a:rPr lang="en-US" sz="2000" dirty="0">
                 <a:latin typeface="Lucida Sans Unicode" panose="020B0602030504020204" pitchFamily="34" charset="0"/>
                 <a:cs typeface="Lucida Sans Unicode" panose="020B0602030504020204" pitchFamily="34" charset="0"/>
               </a:rPr>
-              <a:t>UF &amp; OR – CSS</a:t>
+              <a:t> with a marker cluster group layer by year</a:t>
+            </a:r>
+          </a:p>
+          <a:p>
+            <a:pPr lvl="1"/>
+            <a:r>
+              <a:rPr lang="en-US" sz="2000" dirty="0">
+                <a:latin typeface="Lucida Sans Unicode" panose="020B0602030504020204" pitchFamily="34" charset="0"/>
+                <a:cs typeface="Lucida Sans Unicode" panose="020B0602030504020204" pitchFamily="34" charset="0"/>
+              </a:rPr>
+              <a:t>AG – Plotly Charts: Bar, Bubble, &amp; Stacked Bar</a:t>
+            </a:r>
+          </a:p>
+          <a:p>
+            <a:pPr lvl="1"/>
+            <a:r>
+              <a:rPr lang="en-US" sz="2000" dirty="0">
+                <a:latin typeface="Lucida Sans Unicode" panose="020B0602030504020204" pitchFamily="34" charset="0"/>
+                <a:cs typeface="Lucida Sans Unicode" panose="020B0602030504020204" pitchFamily="34" charset="0"/>
+              </a:rPr>
+              <a:t>MA &amp; </a:t>
+            </a:r>
+            <a:r>
+              <a:rPr lang="en-US" sz="2000" dirty="0" err="1">
+                <a:latin typeface="Lucida Sans Unicode" panose="020B0602030504020204" pitchFamily="34" charset="0"/>
+                <a:cs typeface="Lucida Sans Unicode" panose="020B0602030504020204" pitchFamily="34" charset="0"/>
+              </a:rPr>
+              <a:t>UF</a:t>
+            </a:r>
+            <a:r>
+              <a:rPr lang="en-US" sz="2000" dirty="0">
+                <a:latin typeface="Lucida Sans Unicode" panose="020B0602030504020204" pitchFamily="34" charset="0"/>
+                <a:cs typeface="Lucida Sans Unicode" panose="020B0602030504020204" pitchFamily="34" charset="0"/>
+              </a:rPr>
+              <a:t> - Index html and CSS</a:t>
             </a:r>
           </a:p>
           <a:p>
@@ -5524,41 +5634,28 @@
           <a:p>
             <a:pPr lvl="1"/>
             <a:r>
-              <a:rPr lang="en-US" sz="2000" strike="sngStrike" dirty="0">
-                <a:latin typeface="Lucida Sans Unicode" panose="020B0602030504020204" pitchFamily="34" charset="0"/>
-                <a:cs typeface="Lucida Sans Unicode" panose="020B0602030504020204" pitchFamily="34" charset="0"/>
-              </a:rPr>
-              <a:t>SP - Interactive Pie-chart: Filter by Causes, State and Year</a:t>
-            </a:r>
-          </a:p>
-          <a:p>
-            <a:pPr lvl="1"/>
-            <a:r>
               <a:rPr lang="en-US" sz="2000" dirty="0">
                 <a:latin typeface="Lucida Sans Unicode" panose="020B0602030504020204" pitchFamily="34" charset="0"/>
                 <a:cs typeface="Lucida Sans Unicode" panose="020B0602030504020204" pitchFamily="34" charset="0"/>
               </a:rPr>
-              <a:t>OR - Sun burst chart: Causes by Location and State (and Year?)</a:t>
+              <a:t>SP &amp; OR - Interactive Pie-chart: Filter by State and Year</a:t>
             </a:r>
           </a:p>
           <a:p>
             <a:pPr lvl="1"/>
+            <a:r>
+              <a:rPr lang="en-US" sz="2000" dirty="0" err="1">
+                <a:latin typeface="Lucida Sans Unicode" panose="020B0602030504020204" pitchFamily="34" charset="0"/>
+                <a:cs typeface="Lucida Sans Unicode" panose="020B0602030504020204" pitchFamily="34" charset="0"/>
+              </a:rPr>
+              <a:t>UF</a:t>
+            </a:r>
             <a:r>
               <a:rPr lang="en-US" sz="2000" dirty="0">
                 <a:latin typeface="Lucida Sans Unicode" panose="020B0602030504020204" pitchFamily="34" charset="0"/>
                 <a:cs typeface="Lucida Sans Unicode" panose="020B0602030504020204" pitchFamily="34" charset="0"/>
               </a:rPr>
-              <a:t>UF - Map: Choropleth by State with a color gradient</a:t>
-            </a:r>
-          </a:p>
-          <a:p>
-            <a:pPr lvl="1"/>
-            <a:r>
-              <a:rPr lang="en-US" sz="2000" dirty="0">
-                <a:latin typeface="Lucida Sans Unicode" panose="020B0602030504020204" pitchFamily="34" charset="0"/>
-                <a:cs typeface="Lucida Sans Unicode" panose="020B0602030504020204" pitchFamily="34" charset="0"/>
-              </a:rPr>
-              <a:t>AG - Map: Geomap with a cluster overlay, with flames</a:t>
+              <a:t> - Map: Choropleth by State with a color gradient by count of fires</a:t>
             </a:r>
           </a:p>
         </p:txBody>
@@ -5883,7 +5980,7 @@
       </p:grpSpPr>
       <p:sp>
         <p:nvSpPr>
-          <p:cNvPr id="26" name="Rectangle 9">
+          <p:cNvPr id="32" name="Rectangle 31">
             <a:extLst>
               <a:ext uri="{FF2B5EF4-FFF2-40B4-BE49-F238E27FC236}">
                 <a16:creationId xmlns:a16="http://schemas.microsoft.com/office/drawing/2014/main" id="{F3060C83-F051-4F0E-ABAD-AA0DFC48B218}"/>
@@ -5946,7 +6043,7 @@
       </p:sp>
       <p:sp>
         <p:nvSpPr>
-          <p:cNvPr id="27" name="Freeform: Shape 11">
+          <p:cNvPr id="34" name="Freeform: Shape 33">
             <a:extLst>
               <a:ext uri="{FF2B5EF4-FFF2-40B4-BE49-F238E27FC236}">
                 <a16:creationId xmlns:a16="http://schemas.microsoft.com/office/drawing/2014/main" id="{83C98ABE-055B-441F-B07E-44F97F083C39}"/>
@@ -6062,7 +6159,7 @@
       </p:sp>
       <p:sp>
         <p:nvSpPr>
-          <p:cNvPr id="14" name="Rectangle 13">
+          <p:cNvPr id="36" name="Rectangle 35">
             <a:extLst>
               <a:ext uri="{FF2B5EF4-FFF2-40B4-BE49-F238E27FC236}">
                 <a16:creationId xmlns:a16="http://schemas.microsoft.com/office/drawing/2014/main" id="{29FDB030-9B49-4CED-8CCD-4D99382388AC}"/>
@@ -6127,7 +6224,7 @@
       </p:sp>
       <p:sp>
         <p:nvSpPr>
-          <p:cNvPr id="16" name="Rectangle 15">
+          <p:cNvPr id="38" name="Rectangle 37">
             <a:extLst>
               <a:ext uri="{FF2B5EF4-FFF2-40B4-BE49-F238E27FC236}">
                 <a16:creationId xmlns:a16="http://schemas.microsoft.com/office/drawing/2014/main" id="{3783CA14-24A1-485C-8B30-D6A5D87987AD}"/>
@@ -6192,7 +6289,7 @@
       </p:sp>
       <p:sp>
         <p:nvSpPr>
-          <p:cNvPr id="18" name="Freeform: Shape 17">
+          <p:cNvPr id="40" name="Freeform: Shape 39">
             <a:extLst>
               <a:ext uri="{FF2B5EF4-FFF2-40B4-BE49-F238E27FC236}">
                 <a16:creationId xmlns:a16="http://schemas.microsoft.com/office/drawing/2014/main" id="{9A97C86A-04D6-40F7-AE84-31AB43E6A846}"/>
@@ -6302,7 +6399,7 @@
       </p:sp>
       <p:sp>
         <p:nvSpPr>
-          <p:cNvPr id="20" name="Isosceles Triangle 19">
+          <p:cNvPr id="42" name="Isosceles Triangle 41">
             <a:extLst>
               <a:ext uri="{FF2B5EF4-FFF2-40B4-BE49-F238E27FC236}">
                 <a16:creationId xmlns:a16="http://schemas.microsoft.com/office/drawing/2014/main" id="{FF9F2414-84E8-453E-B1F3-389FDE8192D9}"/>
@@ -6367,10 +6464,10 @@
       </p:sp>
       <p:pic>
         <p:nvPicPr>
-          <p:cNvPr id="5" name="Picture 4">
-            <a:extLst>
-              <a:ext uri="{FF2B5EF4-FFF2-40B4-BE49-F238E27FC236}">
-                <a16:creationId xmlns:a16="http://schemas.microsoft.com/office/drawing/2014/main" id="{CE619A95-251E-430E-8739-4C4E4D22D457}"/>
+          <p:cNvPr id="2" name="Picture 1" descr="A close up of a map&#10;&#10;Description automatically generated">
+            <a:extLst>
+              <a:ext uri="{FF2B5EF4-FFF2-40B4-BE49-F238E27FC236}">
+                <a16:creationId xmlns:a16="http://schemas.microsoft.com/office/drawing/2014/main" id="{6DCDB5DC-763F-45C2-9072-BCC4D2EC3C3A}"/>
               </a:ext>
             </a:extLst>
           </p:cNvPr>
@@ -6381,13 +6478,13 @@
         </p:nvPicPr>
         <p:blipFill rotWithShape="1">
           <a:blip r:embed="rId3"/>
-          <a:srcRect t="11923"/>
+          <a:srcRect l="78"/>
           <a:stretch/>
         </p:blipFill>
         <p:spPr>
           <a:xfrm>
-            <a:off x="643467" y="823682"/>
-            <a:ext cx="10905066" cy="5210634"/>
+            <a:off x="897622" y="643467"/>
+            <a:ext cx="10404979" cy="5571065"/>
           </a:xfrm>
           <a:prstGeom prst="rect">
             <a:avLst/>
@@ -6399,7 +6496,7 @@
       </p:pic>
       <p:sp>
         <p:nvSpPr>
-          <p:cNvPr id="22" name="Isosceles Triangle 21">
+          <p:cNvPr id="44" name="Isosceles Triangle 43">
             <a:extLst>
               <a:ext uri="{FF2B5EF4-FFF2-40B4-BE49-F238E27FC236}">
                 <a16:creationId xmlns:a16="http://schemas.microsoft.com/office/drawing/2014/main" id="{3ECA69A1-7536-43AC-85EF-C7106179F5ED}"/>
@@ -6466,6 +6563,118 @@
     <p:extLst>
       <p:ext uri="{BB962C8B-B14F-4D97-AF65-F5344CB8AC3E}">
         <p14:creationId xmlns:p14="http://schemas.microsoft.com/office/powerpoint/2010/main" val="2600089622"/>
+      </p:ext>
+    </p:extLst>
+  </p:cSld>
+  <p:clrMapOvr>
+    <a:masterClrMapping/>
+  </p:clrMapOvr>
+</p:sld>
+</file>
+
+<file path=ppt/slides/slide5.xml><?xml version="1.0" encoding="utf-8"?>
+<p:sld xmlns:a="http://schemas.openxmlformats.org/drawingml/2006/main" xmlns:r="http://schemas.openxmlformats.org/officeDocument/2006/relationships" xmlns:p="http://schemas.openxmlformats.org/presentationml/2006/main">
+  <p:cSld>
+    <p:spTree>
+      <p:nvGrpSpPr>
+        <p:cNvPr id="1" name=""/>
+        <p:cNvGrpSpPr/>
+        <p:nvPr/>
+      </p:nvGrpSpPr>
+      <p:grpSpPr>
+        <a:xfrm>
+          <a:off x="0" y="0"/>
+          <a:ext cx="0" cy="0"/>
+          <a:chOff x="0" y="0"/>
+          <a:chExt cx="0" cy="0"/>
+        </a:xfrm>
+      </p:grpSpPr>
+      <p:sp>
+        <p:nvSpPr>
+          <p:cNvPr id="2" name="Title 1">
+            <a:extLst>
+              <a:ext uri="{FF2B5EF4-FFF2-40B4-BE49-F238E27FC236}">
+                <a16:creationId xmlns:a16="http://schemas.microsoft.com/office/drawing/2014/main" id="{2B55EDA5-4130-4608-963E-3A8F45DBD4FD}"/>
+              </a:ext>
+            </a:extLst>
+          </p:cNvPr>
+          <p:cNvSpPr>
+            <a:spLocks noGrp="1"/>
+          </p:cNvSpPr>
+          <p:nvPr>
+            <p:ph type="title"/>
+          </p:nvPr>
+        </p:nvSpPr>
+        <p:spPr>
+          <a:xfrm>
+            <a:off x="643467" y="321734"/>
+            <a:ext cx="10905066" cy="1135737"/>
+          </a:xfrm>
+        </p:spPr>
+        <p:txBody>
+          <a:bodyPr>
+            <a:normAutofit/>
+          </a:bodyPr>
+          <a:lstStyle/>
+          <a:p>
+            <a:r>
+              <a:rPr lang="en-US" sz="3600" b="1" dirty="0">
+                <a:latin typeface="Lucida Sans Unicode" panose="020B0602030504020204" pitchFamily="34" charset="0"/>
+                <a:cs typeface="Lucida Sans Unicode" panose="020B0602030504020204" pitchFamily="34" charset="0"/>
+              </a:rPr>
+              <a:t>Project Findings</a:t>
+            </a:r>
+          </a:p>
+        </p:txBody>
+      </p:sp>
+      <p:sp>
+        <p:nvSpPr>
+          <p:cNvPr id="3" name="Content Placeholder 2">
+            <a:extLst>
+              <a:ext uri="{FF2B5EF4-FFF2-40B4-BE49-F238E27FC236}">
+                <a16:creationId xmlns:a16="http://schemas.microsoft.com/office/drawing/2014/main" id="{B6A62B10-DC73-437A-A2BA-250295B8111F}"/>
+              </a:ext>
+            </a:extLst>
+          </p:cNvPr>
+          <p:cNvSpPr>
+            <a:spLocks noGrp="1"/>
+          </p:cNvSpPr>
+          <p:nvPr>
+            <p:ph idx="1"/>
+          </p:nvPr>
+        </p:nvSpPr>
+        <p:spPr>
+          <a:xfrm>
+            <a:off x="643467" y="1166070"/>
+            <a:ext cx="10905066" cy="5148783"/>
+          </a:xfrm>
+        </p:spPr>
+        <p:txBody>
+          <a:bodyPr>
+            <a:normAutofit/>
+          </a:bodyPr>
+          <a:lstStyle/>
+          <a:p>
+            <a:r>
+              <a:rPr lang="en-US" sz="2400" dirty="0">
+                <a:latin typeface="Lucida Sans Unicode" panose="020B0602030504020204" pitchFamily="34" charset="0"/>
+                <a:cs typeface="Lucida Sans Unicode" panose="020B0602030504020204" pitchFamily="34" charset="0"/>
+              </a:rPr>
+              <a:t>In the states most affected by fires, humans are the major contributor</a:t>
+            </a:r>
+          </a:p>
+          <a:p>
+            <a:endParaRPr lang="en-US" sz="2400" dirty="0">
+              <a:latin typeface="Lucida Sans Unicode" panose="020B0602030504020204" pitchFamily="34" charset="0"/>
+              <a:cs typeface="Lucida Sans Unicode" panose="020B0602030504020204" pitchFamily="34" charset="0"/>
+            </a:endParaRPr>
+          </a:p>
+        </p:txBody>
+      </p:sp>
+    </p:spTree>
+    <p:extLst>
+      <p:ext uri="{BB962C8B-B14F-4D97-AF65-F5344CB8AC3E}">
+        <p14:creationId xmlns:p14="http://schemas.microsoft.com/office/powerpoint/2010/main" val="2703713740"/>
       </p:ext>
     </p:extLst>
   </p:cSld>

</xml_diff>